<commit_message>
final commit. presentation added.
</commit_message>
<xml_diff>
--- a/python-project.pptx
+++ b/python-project.pptx
@@ -283,6 +283,11 @@
       </a:defRPr>
     </a:lvl9pPr>
   </p:defaultTextStyle>
+  <p:extLst>
+    <p:ext uri="{EFAFB233-063F-42B5-8137-9DF3F51BA10A}">
+      <p15:sldGuideLst xmlns:p15="http://schemas.microsoft.com/office/powerpoint/2012/main"/>
+    </p:ext>
+  </p:extLst>
 </p:presentation>
 </file>
 
@@ -3111,9 +3116,6 @@
     <p:sldLayoutId id="2147483648" r:id="rId1"/>
     <p:sldLayoutId id="2147483651" r:id="rId2"/>
   </p:sldLayoutIdLst>
-  <p:transition>
-    <p:fade thruBlk="1"/>
-  </p:transition>
   <p:hf hdr="0" ftr="0" dt="0"/>
   <p:txStyles>
     <p:titleStyle>
@@ -10355,8 +10357,8 @@
           </a:p>
         </p:txBody>
       </p:sp>
-      <mc:AlternateContent xmlns:mc="http://schemas.openxmlformats.org/markup-compatibility/2006">
-        <mc:Choice xmlns:a14="http://schemas.microsoft.com/office/drawing/2010/main" Requires="a14">
+      <mc:AlternateContent xmlns:mc="http://schemas.openxmlformats.org/markup-compatibility/2006" xmlns:a14="http://schemas.microsoft.com/office/drawing/2010/main">
+        <mc:Choice Requires="a14">
           <p:sp>
             <p:nvSpPr>
               <p:cNvPr id="6" name="TextBox 5">
@@ -10385,6 +10387,7 @@
               </a:bodyPr>
               <a:lstStyle/>
               <a:p>
+                <a:pPr/>
                 <a14:m>
                   <m:oMathPara xmlns:m="http://schemas.openxmlformats.org/officeDocument/2006/math">
                     <m:oMathParaPr>
@@ -10578,7 +10581,7 @@
             </p:txBody>
           </p:sp>
         </mc:Choice>
-        <mc:Fallback>
+        <mc:Fallback xmlns="">
           <p:sp>
             <p:nvSpPr>
               <p:cNvPr id="6" name="TextBox 5">

</xml_diff>